<commit_message>
update fig1supp2 and abstract
</commit_message>
<xml_diff>
--- a/figures/figure_components/figure1_supplement2.pptx
+++ b/figures/figure_components/figure1_supplement2.pptx
@@ -2,12 +2,12 @@
 <file path=ppt/presentation.xml><?xml version="1.0" encoding="utf-8"?>
 <p:presentation xmlns:a="http://schemas.openxmlformats.org/drawingml/2006/main" xmlns:r="http://schemas.openxmlformats.org/officeDocument/2006/relationships" xmlns:p="http://schemas.openxmlformats.org/presentationml/2006/main" saveSubsetFonts="1" autoCompressPictures="0">
   <p:sldMasterIdLst>
-    <p:sldMasterId id="2147483732" r:id="rId1"/>
+    <p:sldMasterId id="2147483756" r:id="rId1"/>
   </p:sldMasterIdLst>
   <p:sldIdLst>
     <p:sldId id="256" r:id="rId2"/>
   </p:sldIdLst>
-  <p:sldSz cx="11430000" cy="5257800"/>
+  <p:sldSz cx="10287000" cy="5257800"/>
   <p:notesSz cx="6858000" cy="9144000"/>
   <p:defaultTextStyle>
     <a:defPPr>
@@ -141,8 +141,8 @@
         </p:nvSpPr>
         <p:spPr>
           <a:xfrm>
-            <a:off x="1428750" y="860478"/>
-            <a:ext cx="8572500" cy="1830493"/>
+            <a:off x="1285875" y="860478"/>
+            <a:ext cx="7715250" cy="1830493"/>
           </a:xfrm>
         </p:spPr>
         <p:txBody>
@@ -173,8 +173,8 @@
         </p:nvSpPr>
         <p:spPr>
           <a:xfrm>
-            <a:off x="1428750" y="2761562"/>
-            <a:ext cx="8572500" cy="1269418"/>
+            <a:off x="1285875" y="2761562"/>
+            <a:ext cx="7715250" cy="1269418"/>
           </a:xfrm>
         </p:spPr>
         <p:txBody>
@@ -243,7 +243,7 @@
           <a:p>
             <a:fld id="{E012170B-B328-DE46-86BB-2EFA10D5417A}" type="datetimeFigureOut">
               <a:rPr lang="en-US" smtClean="0"/>
-              <a:t>10/16/20</a:t>
+              <a:t>10/26/20</a:t>
             </a:fld>
             <a:endParaRPr lang="en-US"/>
           </a:p>
@@ -294,7 +294,7 @@
     </p:spTree>
     <p:extLst>
       <p:ext uri="{BB962C8B-B14F-4D97-AF65-F5344CB8AC3E}">
-        <p14:creationId xmlns:p14="http://schemas.microsoft.com/office/powerpoint/2010/main" val="180756783"/>
+        <p14:creationId xmlns:p14="http://schemas.microsoft.com/office/powerpoint/2010/main" val="1506853308"/>
       </p:ext>
     </p:extLst>
   </p:cSld>
@@ -413,7 +413,7 @@
           <a:p>
             <a:fld id="{E012170B-B328-DE46-86BB-2EFA10D5417A}" type="datetimeFigureOut">
               <a:rPr lang="en-US" smtClean="0"/>
-              <a:t>10/16/20</a:t>
+              <a:t>10/26/20</a:t>
             </a:fld>
             <a:endParaRPr lang="en-US"/>
           </a:p>
@@ -464,7 +464,7 @@
     </p:spTree>
     <p:extLst>
       <p:ext uri="{BB962C8B-B14F-4D97-AF65-F5344CB8AC3E}">
-        <p14:creationId xmlns:p14="http://schemas.microsoft.com/office/powerpoint/2010/main" val="972513312"/>
+        <p14:creationId xmlns:p14="http://schemas.microsoft.com/office/powerpoint/2010/main" val="3831631057"/>
       </p:ext>
     </p:extLst>
   </p:cSld>
@@ -503,8 +503,8 @@
         </p:nvSpPr>
         <p:spPr>
           <a:xfrm>
-            <a:off x="8179594" y="279929"/>
-            <a:ext cx="2464594" cy="4455742"/>
+            <a:off x="7361635" y="279929"/>
+            <a:ext cx="2218134" cy="4455742"/>
           </a:xfrm>
         </p:spPr>
         <p:txBody>
@@ -531,8 +531,8 @@
         </p:nvSpPr>
         <p:spPr>
           <a:xfrm>
-            <a:off x="785813" y="279929"/>
-            <a:ext cx="7250906" cy="4455742"/>
+            <a:off x="707231" y="279929"/>
+            <a:ext cx="6525816" cy="4455742"/>
           </a:xfrm>
         </p:spPr>
         <p:txBody>
@@ -593,7 +593,7 @@
           <a:p>
             <a:fld id="{E012170B-B328-DE46-86BB-2EFA10D5417A}" type="datetimeFigureOut">
               <a:rPr lang="en-US" smtClean="0"/>
-              <a:t>10/16/20</a:t>
+              <a:t>10/26/20</a:t>
             </a:fld>
             <a:endParaRPr lang="en-US"/>
           </a:p>
@@ -644,7 +644,7 @@
     </p:spTree>
     <p:extLst>
       <p:ext uri="{BB962C8B-B14F-4D97-AF65-F5344CB8AC3E}">
-        <p14:creationId xmlns:p14="http://schemas.microsoft.com/office/powerpoint/2010/main" val="772186085"/>
+        <p14:creationId xmlns:p14="http://schemas.microsoft.com/office/powerpoint/2010/main" val="3277598003"/>
       </p:ext>
     </p:extLst>
   </p:cSld>
@@ -763,7 +763,7 @@
           <a:p>
             <a:fld id="{E012170B-B328-DE46-86BB-2EFA10D5417A}" type="datetimeFigureOut">
               <a:rPr lang="en-US" smtClean="0"/>
-              <a:t>10/16/20</a:t>
+              <a:t>10/26/20</a:t>
             </a:fld>
             <a:endParaRPr lang="en-US"/>
           </a:p>
@@ -814,7 +814,7 @@
     </p:spTree>
     <p:extLst>
       <p:ext uri="{BB962C8B-B14F-4D97-AF65-F5344CB8AC3E}">
-        <p14:creationId xmlns:p14="http://schemas.microsoft.com/office/powerpoint/2010/main" val="290454550"/>
+        <p14:creationId xmlns:p14="http://schemas.microsoft.com/office/powerpoint/2010/main" val="1662472075"/>
       </p:ext>
     </p:extLst>
   </p:cSld>
@@ -853,8 +853,8 @@
         </p:nvSpPr>
         <p:spPr>
           <a:xfrm>
-            <a:off x="779859" y="1310800"/>
-            <a:ext cx="9858375" cy="2187098"/>
+            <a:off x="701873" y="1310800"/>
+            <a:ext cx="8872538" cy="2187098"/>
           </a:xfrm>
         </p:spPr>
         <p:txBody>
@@ -885,8 +885,8 @@
         </p:nvSpPr>
         <p:spPr>
           <a:xfrm>
-            <a:off x="779859" y="3518589"/>
-            <a:ext cx="9858375" cy="1150143"/>
+            <a:off x="701873" y="3518589"/>
+            <a:ext cx="8872538" cy="1150143"/>
           </a:xfrm>
         </p:spPr>
         <p:txBody>
@@ -1009,7 +1009,7 @@
           <a:p>
             <a:fld id="{E012170B-B328-DE46-86BB-2EFA10D5417A}" type="datetimeFigureOut">
               <a:rPr lang="en-US" smtClean="0"/>
-              <a:t>10/16/20</a:t>
+              <a:t>10/26/20</a:t>
             </a:fld>
             <a:endParaRPr lang="en-US"/>
           </a:p>
@@ -1060,7 +1060,7 @@
     </p:spTree>
     <p:extLst>
       <p:ext uri="{BB962C8B-B14F-4D97-AF65-F5344CB8AC3E}">
-        <p14:creationId xmlns:p14="http://schemas.microsoft.com/office/powerpoint/2010/main" val="3238303903"/>
+        <p14:creationId xmlns:p14="http://schemas.microsoft.com/office/powerpoint/2010/main" val="3110212957"/>
       </p:ext>
     </p:extLst>
   </p:cSld>
@@ -1122,8 +1122,8 @@
         </p:nvSpPr>
         <p:spPr>
           <a:xfrm>
-            <a:off x="785813" y="1399646"/>
-            <a:ext cx="4857750" cy="3336026"/>
+            <a:off x="707231" y="1399646"/>
+            <a:ext cx="4371975" cy="3336026"/>
           </a:xfrm>
         </p:spPr>
         <p:txBody>
@@ -1179,8 +1179,8 @@
         </p:nvSpPr>
         <p:spPr>
           <a:xfrm>
-            <a:off x="5786438" y="1399646"/>
-            <a:ext cx="4857750" cy="3336026"/>
+            <a:off x="5207794" y="1399646"/>
+            <a:ext cx="4371975" cy="3336026"/>
           </a:xfrm>
         </p:spPr>
         <p:txBody>
@@ -1241,7 +1241,7 @@
           <a:p>
             <a:fld id="{E012170B-B328-DE46-86BB-2EFA10D5417A}" type="datetimeFigureOut">
               <a:rPr lang="en-US" smtClean="0"/>
-              <a:t>10/16/20</a:t>
+              <a:t>10/26/20</a:t>
             </a:fld>
             <a:endParaRPr lang="en-US"/>
           </a:p>
@@ -1292,7 +1292,7 @@
     </p:spTree>
     <p:extLst>
       <p:ext uri="{BB962C8B-B14F-4D97-AF65-F5344CB8AC3E}">
-        <p14:creationId xmlns:p14="http://schemas.microsoft.com/office/powerpoint/2010/main" val="1433507388"/>
+        <p14:creationId xmlns:p14="http://schemas.microsoft.com/office/powerpoint/2010/main" val="1986814169"/>
       </p:ext>
     </p:extLst>
   </p:cSld>
@@ -1331,8 +1331,8 @@
         </p:nvSpPr>
         <p:spPr>
           <a:xfrm>
-            <a:off x="787301" y="279930"/>
-            <a:ext cx="9858375" cy="1016265"/>
+            <a:off x="708571" y="279930"/>
+            <a:ext cx="8872538" cy="1016265"/>
           </a:xfrm>
         </p:spPr>
         <p:txBody>
@@ -1359,8 +1359,8 @@
         </p:nvSpPr>
         <p:spPr>
           <a:xfrm>
-            <a:off x="787302" y="1288892"/>
-            <a:ext cx="4835425" cy="631666"/>
+            <a:off x="708571" y="1288892"/>
+            <a:ext cx="4351883" cy="631666"/>
           </a:xfrm>
         </p:spPr>
         <p:txBody>
@@ -1424,8 +1424,8 @@
         </p:nvSpPr>
         <p:spPr>
           <a:xfrm>
-            <a:off x="787302" y="1920557"/>
-            <a:ext cx="4835425" cy="2824851"/>
+            <a:off x="708571" y="1920557"/>
+            <a:ext cx="4351883" cy="2824851"/>
           </a:xfrm>
         </p:spPr>
         <p:txBody>
@@ -1481,8 +1481,8 @@
         </p:nvSpPr>
         <p:spPr>
           <a:xfrm>
-            <a:off x="5786437" y="1288892"/>
-            <a:ext cx="4859239" cy="631666"/>
+            <a:off x="5207794" y="1288892"/>
+            <a:ext cx="4373315" cy="631666"/>
           </a:xfrm>
         </p:spPr>
         <p:txBody>
@@ -1546,8 +1546,8 @@
         </p:nvSpPr>
         <p:spPr>
           <a:xfrm>
-            <a:off x="5786437" y="1920557"/>
-            <a:ext cx="4859239" cy="2824851"/>
+            <a:off x="5207794" y="1920557"/>
+            <a:ext cx="4373315" cy="2824851"/>
           </a:xfrm>
         </p:spPr>
         <p:txBody>
@@ -1608,7 +1608,7 @@
           <a:p>
             <a:fld id="{E012170B-B328-DE46-86BB-2EFA10D5417A}" type="datetimeFigureOut">
               <a:rPr lang="en-US" smtClean="0"/>
-              <a:t>10/16/20</a:t>
+              <a:t>10/26/20</a:t>
             </a:fld>
             <a:endParaRPr lang="en-US"/>
           </a:p>
@@ -1659,7 +1659,7 @@
     </p:spTree>
     <p:extLst>
       <p:ext uri="{BB962C8B-B14F-4D97-AF65-F5344CB8AC3E}">
-        <p14:creationId xmlns:p14="http://schemas.microsoft.com/office/powerpoint/2010/main" val="1761648755"/>
+        <p14:creationId xmlns:p14="http://schemas.microsoft.com/office/powerpoint/2010/main" val="3157043433"/>
       </p:ext>
     </p:extLst>
   </p:cSld>
@@ -1726,7 +1726,7 @@
           <a:p>
             <a:fld id="{E012170B-B328-DE46-86BB-2EFA10D5417A}" type="datetimeFigureOut">
               <a:rPr lang="en-US" smtClean="0"/>
-              <a:t>10/16/20</a:t>
+              <a:t>10/26/20</a:t>
             </a:fld>
             <a:endParaRPr lang="en-US"/>
           </a:p>
@@ -1777,7 +1777,7 @@
     </p:spTree>
     <p:extLst>
       <p:ext uri="{BB962C8B-B14F-4D97-AF65-F5344CB8AC3E}">
-        <p14:creationId xmlns:p14="http://schemas.microsoft.com/office/powerpoint/2010/main" val="425301409"/>
+        <p14:creationId xmlns:p14="http://schemas.microsoft.com/office/powerpoint/2010/main" val="1663194994"/>
       </p:ext>
     </p:extLst>
   </p:cSld>
@@ -1821,7 +1821,7 @@
           <a:p>
             <a:fld id="{E012170B-B328-DE46-86BB-2EFA10D5417A}" type="datetimeFigureOut">
               <a:rPr lang="en-US" smtClean="0"/>
-              <a:t>10/16/20</a:t>
+              <a:t>10/26/20</a:t>
             </a:fld>
             <a:endParaRPr lang="en-US"/>
           </a:p>
@@ -1872,7 +1872,7 @@
     </p:spTree>
     <p:extLst>
       <p:ext uri="{BB962C8B-B14F-4D97-AF65-F5344CB8AC3E}">
-        <p14:creationId xmlns:p14="http://schemas.microsoft.com/office/powerpoint/2010/main" val="1056576032"/>
+        <p14:creationId xmlns:p14="http://schemas.microsoft.com/office/powerpoint/2010/main" val="4269565752"/>
       </p:ext>
     </p:extLst>
   </p:cSld>
@@ -1911,8 +1911,8 @@
         </p:nvSpPr>
         <p:spPr>
           <a:xfrm>
-            <a:off x="787302" y="350520"/>
-            <a:ext cx="3686472" cy="1226820"/>
+            <a:off x="708572" y="350520"/>
+            <a:ext cx="3317825" cy="1226820"/>
           </a:xfrm>
         </p:spPr>
         <p:txBody>
@@ -1943,8 +1943,8 @@
         </p:nvSpPr>
         <p:spPr>
           <a:xfrm>
-            <a:off x="4859238" y="757026"/>
-            <a:ext cx="5786438" cy="3736446"/>
+            <a:off x="4373315" y="757026"/>
+            <a:ext cx="5207794" cy="3736446"/>
           </a:xfrm>
         </p:spPr>
         <p:txBody>
@@ -2028,8 +2028,8 @@
         </p:nvSpPr>
         <p:spPr>
           <a:xfrm>
-            <a:off x="787302" y="1577340"/>
-            <a:ext cx="3686472" cy="2922217"/>
+            <a:off x="708572" y="1577340"/>
+            <a:ext cx="3317825" cy="2922217"/>
           </a:xfrm>
         </p:spPr>
         <p:txBody>
@@ -2098,7 +2098,7 @@
           <a:p>
             <a:fld id="{E012170B-B328-DE46-86BB-2EFA10D5417A}" type="datetimeFigureOut">
               <a:rPr lang="en-US" smtClean="0"/>
-              <a:t>10/16/20</a:t>
+              <a:t>10/26/20</a:t>
             </a:fld>
             <a:endParaRPr lang="en-US"/>
           </a:p>
@@ -2149,7 +2149,7 @@
     </p:spTree>
     <p:extLst>
       <p:ext uri="{BB962C8B-B14F-4D97-AF65-F5344CB8AC3E}">
-        <p14:creationId xmlns:p14="http://schemas.microsoft.com/office/powerpoint/2010/main" val="3523739166"/>
+        <p14:creationId xmlns:p14="http://schemas.microsoft.com/office/powerpoint/2010/main" val="1378544736"/>
       </p:ext>
     </p:extLst>
   </p:cSld>
@@ -2188,8 +2188,8 @@
         </p:nvSpPr>
         <p:spPr>
           <a:xfrm>
-            <a:off x="787302" y="350520"/>
-            <a:ext cx="3686472" cy="1226820"/>
+            <a:off x="708572" y="350520"/>
+            <a:ext cx="3317825" cy="1226820"/>
           </a:xfrm>
         </p:spPr>
         <p:txBody>
@@ -2220,8 +2220,8 @@
         </p:nvSpPr>
         <p:spPr>
           <a:xfrm>
-            <a:off x="4859238" y="757026"/>
-            <a:ext cx="5786438" cy="3736446"/>
+            <a:off x="4373315" y="757026"/>
+            <a:ext cx="5207794" cy="3736446"/>
           </a:xfrm>
         </p:spPr>
         <p:txBody>
@@ -2285,8 +2285,8 @@
         </p:nvSpPr>
         <p:spPr>
           <a:xfrm>
-            <a:off x="787302" y="1577340"/>
-            <a:ext cx="3686472" cy="2922217"/>
+            <a:off x="708572" y="1577340"/>
+            <a:ext cx="3317825" cy="2922217"/>
           </a:xfrm>
         </p:spPr>
         <p:txBody>
@@ -2355,7 +2355,7 @@
           <a:p>
             <a:fld id="{E012170B-B328-DE46-86BB-2EFA10D5417A}" type="datetimeFigureOut">
               <a:rPr lang="en-US" smtClean="0"/>
-              <a:t>10/16/20</a:t>
+              <a:t>10/26/20</a:t>
             </a:fld>
             <a:endParaRPr lang="en-US"/>
           </a:p>
@@ -2406,7 +2406,7 @@
     </p:spTree>
     <p:extLst>
       <p:ext uri="{BB962C8B-B14F-4D97-AF65-F5344CB8AC3E}">
-        <p14:creationId xmlns:p14="http://schemas.microsoft.com/office/powerpoint/2010/main" val="2329981501"/>
+        <p14:creationId xmlns:p14="http://schemas.microsoft.com/office/powerpoint/2010/main" val="3762089034"/>
       </p:ext>
     </p:extLst>
   </p:cSld>
@@ -2450,8 +2450,8 @@
         </p:nvSpPr>
         <p:spPr>
           <a:xfrm>
-            <a:off x="785813" y="279930"/>
-            <a:ext cx="9858375" cy="1016265"/>
+            <a:off x="707231" y="279930"/>
+            <a:ext cx="8872538" cy="1016265"/>
           </a:xfrm>
           <a:prstGeom prst="rect">
             <a:avLst/>
@@ -2483,8 +2483,8 @@
         </p:nvSpPr>
         <p:spPr>
           <a:xfrm>
-            <a:off x="785813" y="1399646"/>
-            <a:ext cx="9858375" cy="3336026"/>
+            <a:off x="707231" y="1399646"/>
+            <a:ext cx="8872538" cy="3336026"/>
           </a:xfrm>
           <a:prstGeom prst="rect">
             <a:avLst/>
@@ -2545,8 +2545,8 @@
         </p:nvSpPr>
         <p:spPr>
           <a:xfrm>
-            <a:off x="785813" y="4873202"/>
-            <a:ext cx="2571750" cy="279929"/>
+            <a:off x="707231" y="4873202"/>
+            <a:ext cx="2314575" cy="279929"/>
           </a:xfrm>
           <a:prstGeom prst="rect">
             <a:avLst/>
@@ -2568,7 +2568,7 @@
           <a:p>
             <a:fld id="{E012170B-B328-DE46-86BB-2EFA10D5417A}" type="datetimeFigureOut">
               <a:rPr lang="en-US" smtClean="0"/>
-              <a:t>10/16/20</a:t>
+              <a:t>10/26/20</a:t>
             </a:fld>
             <a:endParaRPr lang="en-US"/>
           </a:p>
@@ -2586,8 +2586,8 @@
         </p:nvSpPr>
         <p:spPr>
           <a:xfrm>
-            <a:off x="3786188" y="4873202"/>
-            <a:ext cx="3857625" cy="279929"/>
+            <a:off x="3407569" y="4873202"/>
+            <a:ext cx="3471863" cy="279929"/>
           </a:xfrm>
           <a:prstGeom prst="rect">
             <a:avLst/>
@@ -2623,8 +2623,8 @@
         </p:nvSpPr>
         <p:spPr>
           <a:xfrm>
-            <a:off x="8072438" y="4873202"/>
-            <a:ext cx="2571750" cy="279929"/>
+            <a:off x="7265194" y="4873202"/>
+            <a:ext cx="2314575" cy="279929"/>
           </a:xfrm>
           <a:prstGeom prst="rect">
             <a:avLst/>
@@ -2655,23 +2655,23 @@
     </p:spTree>
     <p:extLst>
       <p:ext uri="{BB962C8B-B14F-4D97-AF65-F5344CB8AC3E}">
-        <p14:creationId xmlns:p14="http://schemas.microsoft.com/office/powerpoint/2010/main" val="1329248575"/>
+        <p14:creationId xmlns:p14="http://schemas.microsoft.com/office/powerpoint/2010/main" val="1765657051"/>
       </p:ext>
     </p:extLst>
   </p:cSld>
   <p:clrMap bg1="lt1" tx1="dk1" bg2="lt2" tx2="dk2" accent1="accent1" accent2="accent2" accent3="accent3" accent4="accent4" accent5="accent5" accent6="accent6" hlink="hlink" folHlink="folHlink"/>
   <p:sldLayoutIdLst>
-    <p:sldLayoutId id="2147483733" r:id="rId1"/>
-    <p:sldLayoutId id="2147483734" r:id="rId2"/>
-    <p:sldLayoutId id="2147483735" r:id="rId3"/>
-    <p:sldLayoutId id="2147483736" r:id="rId4"/>
-    <p:sldLayoutId id="2147483737" r:id="rId5"/>
-    <p:sldLayoutId id="2147483738" r:id="rId6"/>
-    <p:sldLayoutId id="2147483739" r:id="rId7"/>
-    <p:sldLayoutId id="2147483740" r:id="rId8"/>
-    <p:sldLayoutId id="2147483741" r:id="rId9"/>
-    <p:sldLayoutId id="2147483742" r:id="rId10"/>
-    <p:sldLayoutId id="2147483743" r:id="rId11"/>
+    <p:sldLayoutId id="2147483757" r:id="rId1"/>
+    <p:sldLayoutId id="2147483758" r:id="rId2"/>
+    <p:sldLayoutId id="2147483759" r:id="rId3"/>
+    <p:sldLayoutId id="2147483760" r:id="rId4"/>
+    <p:sldLayoutId id="2147483761" r:id="rId5"/>
+    <p:sldLayoutId id="2147483762" r:id="rId6"/>
+    <p:sldLayoutId id="2147483763" r:id="rId7"/>
+    <p:sldLayoutId id="2147483764" r:id="rId8"/>
+    <p:sldLayoutId id="2147483765" r:id="rId9"/>
+    <p:sldLayoutId id="2147483766" r:id="rId10"/>
+    <p:sldLayoutId id="2147483767" r:id="rId11"/>
   </p:sldLayoutIdLst>
   <p:txStyles>
     <p:titleStyle>
@@ -2973,858 +2973,12 @@
           <a:chExt cx="0" cy="0"/>
         </a:xfrm>
       </p:grpSpPr>
-      <p:grpSp>
-        <p:nvGrpSpPr>
-          <p:cNvPr id="54" name="Group 53">
+      <p:pic>
+        <p:nvPicPr>
+          <p:cNvPr id="5" name="Picture 4">
             <a:extLst>
               <a:ext uri="{FF2B5EF4-FFF2-40B4-BE49-F238E27FC236}">
-                <a16:creationId xmlns:a16="http://schemas.microsoft.com/office/drawing/2014/main" id="{FC74BBA5-925C-7145-9E47-6102528947BD}"/>
-              </a:ext>
-            </a:extLst>
-          </p:cNvPr>
-          <p:cNvGrpSpPr/>
-          <p:nvPr/>
-        </p:nvGrpSpPr>
-        <p:grpSpPr>
-          <a:xfrm>
-            <a:off x="5967611" y="106017"/>
-            <a:ext cx="5839221" cy="4826600"/>
-            <a:chOff x="6141314" y="152077"/>
-            <a:chExt cx="5839221" cy="4826600"/>
-          </a:xfrm>
-        </p:grpSpPr>
-        <p:grpSp>
-          <p:nvGrpSpPr>
-            <p:cNvPr id="52" name="Group 51">
-              <a:extLst>
-                <a:ext uri="{FF2B5EF4-FFF2-40B4-BE49-F238E27FC236}">
-                  <a16:creationId xmlns:a16="http://schemas.microsoft.com/office/drawing/2014/main" id="{14AEFD75-256E-424E-95E8-7673BDF1107B}"/>
-                </a:ext>
-              </a:extLst>
-            </p:cNvPr>
-            <p:cNvGrpSpPr/>
-            <p:nvPr/>
-          </p:nvGrpSpPr>
-          <p:grpSpPr>
-            <a:xfrm>
-              <a:off x="6141314" y="152077"/>
-              <a:ext cx="5839221" cy="4826600"/>
-              <a:chOff x="6141314" y="152077"/>
-              <a:chExt cx="5839221" cy="4826600"/>
-            </a:xfrm>
-          </p:grpSpPr>
-          <p:grpSp>
-            <p:nvGrpSpPr>
-              <p:cNvPr id="50" name="Group 49">
-                <a:extLst>
-                  <a:ext uri="{FF2B5EF4-FFF2-40B4-BE49-F238E27FC236}">
-                    <a16:creationId xmlns:a16="http://schemas.microsoft.com/office/drawing/2014/main" id="{A6D6C705-55A9-C843-BF91-434F72F5FEDA}"/>
-                  </a:ext>
-                </a:extLst>
-              </p:cNvPr>
-              <p:cNvGrpSpPr/>
-              <p:nvPr/>
-            </p:nvGrpSpPr>
-            <p:grpSpPr>
-              <a:xfrm>
-                <a:off x="6141314" y="152077"/>
-                <a:ext cx="5839221" cy="4826600"/>
-                <a:chOff x="6141314" y="152077"/>
-                <a:chExt cx="5839221" cy="4826600"/>
-              </a:xfrm>
-            </p:grpSpPr>
-            <p:pic>
-              <p:nvPicPr>
-                <p:cNvPr id="25" name="Picture 24">
-                  <a:extLst>
-                    <a:ext uri="{FF2B5EF4-FFF2-40B4-BE49-F238E27FC236}">
-                      <a16:creationId xmlns:a16="http://schemas.microsoft.com/office/drawing/2014/main" id="{5A95504E-7C92-1940-8821-EF6B1A4E7E97}"/>
-                    </a:ext>
-                  </a:extLst>
-                </p:cNvPr>
-                <p:cNvPicPr>
-                  <a:picLocks noChangeAspect="1"/>
-                </p:cNvPicPr>
-                <p:nvPr/>
-              </p:nvPicPr>
-              <p:blipFill rotWithShape="1">
-                <a:blip r:embed="rId2"/>
-                <a:srcRect t="1314" b="3070"/>
-                <a:stretch/>
-              </p:blipFill>
-              <p:spPr>
-                <a:xfrm>
-                  <a:off x="6221949" y="189721"/>
-                  <a:ext cx="5758586" cy="4788956"/>
-                </a:xfrm>
-                <a:prstGeom prst="rect">
-                  <a:avLst/>
-                </a:prstGeom>
-              </p:spPr>
-            </p:pic>
-            <p:pic>
-              <p:nvPicPr>
-                <p:cNvPr id="26" name="Picture 25">
-                  <a:extLst>
-                    <a:ext uri="{FF2B5EF4-FFF2-40B4-BE49-F238E27FC236}">
-                      <a16:creationId xmlns:a16="http://schemas.microsoft.com/office/drawing/2014/main" id="{95D7D758-8301-7B4B-B151-F358A17324B4}"/>
-                    </a:ext>
-                  </a:extLst>
-                </p:cNvPr>
-                <p:cNvPicPr>
-                  <a:picLocks noChangeAspect="1"/>
-                </p:cNvPicPr>
-                <p:nvPr/>
-              </p:nvPicPr>
-              <p:blipFill rotWithShape="1">
-                <a:blip r:embed="rId3"/>
-                <a:srcRect l="21142" t="29207" r="77614" b="69101"/>
-                <a:stretch/>
-              </p:blipFill>
-              <p:spPr>
-                <a:xfrm>
-                  <a:off x="6141314" y="152077"/>
-                  <a:ext cx="1179143" cy="306538"/>
-                </a:xfrm>
-                <a:prstGeom prst="rect">
-                  <a:avLst/>
-                </a:prstGeom>
-              </p:spPr>
-            </p:pic>
-            <p:pic>
-              <p:nvPicPr>
-                <p:cNvPr id="27" name="Picture 26">
-                  <a:extLst>
-                    <a:ext uri="{FF2B5EF4-FFF2-40B4-BE49-F238E27FC236}">
-                      <a16:creationId xmlns:a16="http://schemas.microsoft.com/office/drawing/2014/main" id="{D9BEB540-E279-7E4A-A7D7-F30585073D5F}"/>
-                    </a:ext>
-                  </a:extLst>
-                </p:cNvPr>
-                <p:cNvPicPr>
-                  <a:picLocks noChangeAspect="1"/>
-                </p:cNvPicPr>
-                <p:nvPr/>
-              </p:nvPicPr>
-              <p:blipFill rotWithShape="1">
-                <a:blip r:embed="rId2"/>
-                <a:srcRect l="21812" t="19840" r="50140" b="64585"/>
-                <a:stretch/>
-              </p:blipFill>
-              <p:spPr>
-                <a:xfrm>
-                  <a:off x="10154131" y="533797"/>
-                  <a:ext cx="1615217" cy="780034"/>
-                </a:xfrm>
-                <a:prstGeom prst="rect">
-                  <a:avLst/>
-                </a:prstGeom>
-              </p:spPr>
-            </p:pic>
-            <p:pic>
-              <p:nvPicPr>
-                <p:cNvPr id="28" name="Picture 27">
-                  <a:extLst>
-                    <a:ext uri="{FF2B5EF4-FFF2-40B4-BE49-F238E27FC236}">
-                      <a16:creationId xmlns:a16="http://schemas.microsoft.com/office/drawing/2014/main" id="{B46AA3DD-1833-A34C-8935-4F839E3F0B0A}"/>
-                    </a:ext>
-                  </a:extLst>
-                </p:cNvPr>
-                <p:cNvPicPr>
-                  <a:picLocks noChangeAspect="1"/>
-                </p:cNvPicPr>
-                <p:nvPr/>
-              </p:nvPicPr>
-              <p:blipFill rotWithShape="1">
-                <a:blip r:embed="rId2"/>
-                <a:srcRect l="21904" t="19840" r="61741" b="66974"/>
-                <a:stretch/>
-              </p:blipFill>
-              <p:spPr>
-                <a:xfrm>
-                  <a:off x="10827553" y="181241"/>
-                  <a:ext cx="941796" cy="660401"/>
-                </a:xfrm>
-                <a:prstGeom prst="rect">
-                  <a:avLst/>
-                </a:prstGeom>
-              </p:spPr>
-            </p:pic>
-            <p:pic>
-              <p:nvPicPr>
-                <p:cNvPr id="29" name="Picture 28">
-                  <a:extLst>
-                    <a:ext uri="{FF2B5EF4-FFF2-40B4-BE49-F238E27FC236}">
-                      <a16:creationId xmlns:a16="http://schemas.microsoft.com/office/drawing/2014/main" id="{5FECDFE0-FF85-EB4D-A925-15F78FEB14E0}"/>
-                    </a:ext>
-                  </a:extLst>
-                </p:cNvPr>
-                <p:cNvPicPr>
-                  <a:picLocks noChangeAspect="1"/>
-                </p:cNvPicPr>
-                <p:nvPr/>
-              </p:nvPicPr>
-              <p:blipFill rotWithShape="1">
-                <a:blip r:embed="rId2"/>
-                <a:srcRect l="21811" t="19840" r="50140" b="66974"/>
-                <a:stretch/>
-              </p:blipFill>
-              <p:spPr>
-                <a:xfrm>
-                  <a:off x="10154130" y="1144498"/>
-                  <a:ext cx="1615218" cy="660401"/>
-                </a:xfrm>
-                <a:prstGeom prst="rect">
-                  <a:avLst/>
-                </a:prstGeom>
-              </p:spPr>
-            </p:pic>
-            <p:pic>
-              <p:nvPicPr>
-                <p:cNvPr id="30" name="Picture 29">
-                  <a:extLst>
-                    <a:ext uri="{FF2B5EF4-FFF2-40B4-BE49-F238E27FC236}">
-                      <a16:creationId xmlns:a16="http://schemas.microsoft.com/office/drawing/2014/main" id="{FD643169-972B-1A45-8B3B-E854057F0ECA}"/>
-                    </a:ext>
-                  </a:extLst>
-                </p:cNvPr>
-                <p:cNvPicPr>
-                  <a:picLocks noChangeAspect="1"/>
-                </p:cNvPicPr>
-                <p:nvPr/>
-              </p:nvPicPr>
-              <p:blipFill rotWithShape="1">
-                <a:blip r:embed="rId2"/>
-                <a:srcRect l="31614" t="19840" r="50140" b="75314"/>
-                <a:stretch/>
-              </p:blipFill>
-              <p:spPr>
-                <a:xfrm>
-                  <a:off x="10718617" y="1777554"/>
-                  <a:ext cx="1050731" cy="242709"/>
-                </a:xfrm>
-                <a:prstGeom prst="rect">
-                  <a:avLst/>
-                </a:prstGeom>
-              </p:spPr>
-            </p:pic>
-            <p:pic>
-              <p:nvPicPr>
-                <p:cNvPr id="31" name="Picture 30">
-                  <a:extLst>
-                    <a:ext uri="{FF2B5EF4-FFF2-40B4-BE49-F238E27FC236}">
-                      <a16:creationId xmlns:a16="http://schemas.microsoft.com/office/drawing/2014/main" id="{7A65BD44-80AB-BB4F-B113-39D37FE736A3}"/>
-                    </a:ext>
-                  </a:extLst>
-                </p:cNvPr>
-                <p:cNvPicPr>
-                  <a:picLocks noChangeAspect="1"/>
-                </p:cNvPicPr>
-                <p:nvPr/>
-              </p:nvPicPr>
-              <p:blipFill rotWithShape="1">
-                <a:blip r:embed="rId2"/>
-                <a:srcRect l="21352" t="29368" r="50140" b="68439"/>
-                <a:stretch/>
-              </p:blipFill>
-              <p:spPr>
-                <a:xfrm>
-                  <a:off x="10127723" y="1452343"/>
-                  <a:ext cx="1641625" cy="109847"/>
-                </a:xfrm>
-                <a:prstGeom prst="rect">
-                  <a:avLst/>
-                </a:prstGeom>
-              </p:spPr>
-            </p:pic>
-            <p:pic>
-              <p:nvPicPr>
-                <p:cNvPr id="32" name="Picture 31">
-                  <a:extLst>
-                    <a:ext uri="{FF2B5EF4-FFF2-40B4-BE49-F238E27FC236}">
-                      <a16:creationId xmlns:a16="http://schemas.microsoft.com/office/drawing/2014/main" id="{02844474-F68B-C84F-BD0E-16BE28117650}"/>
-                    </a:ext>
-                  </a:extLst>
-                </p:cNvPr>
-                <p:cNvPicPr>
-                  <a:picLocks noChangeAspect="1"/>
-                </p:cNvPicPr>
-                <p:nvPr/>
-              </p:nvPicPr>
-              <p:blipFill rotWithShape="1">
-                <a:blip r:embed="rId2"/>
-                <a:srcRect l="31614" t="19840" r="50139" b="75860"/>
-                <a:stretch/>
-              </p:blipFill>
-              <p:spPr>
-                <a:xfrm>
-                  <a:off x="10718617" y="2020264"/>
-                  <a:ext cx="1050731" cy="215364"/>
-                </a:xfrm>
-                <a:prstGeom prst="rect">
-                  <a:avLst/>
-                </a:prstGeom>
-              </p:spPr>
-            </p:pic>
-            <p:pic>
-              <p:nvPicPr>
-                <p:cNvPr id="33" name="Picture 32">
-                  <a:extLst>
-                    <a:ext uri="{FF2B5EF4-FFF2-40B4-BE49-F238E27FC236}">
-                      <a16:creationId xmlns:a16="http://schemas.microsoft.com/office/drawing/2014/main" id="{725A8F94-E402-134A-AEF6-2D92E85DA37B}"/>
-                    </a:ext>
-                  </a:extLst>
-                </p:cNvPr>
-                <p:cNvPicPr>
-                  <a:picLocks noChangeAspect="1"/>
-                </p:cNvPicPr>
-                <p:nvPr/>
-              </p:nvPicPr>
-              <p:blipFill rotWithShape="1">
-                <a:blip r:embed="rId2"/>
-                <a:srcRect l="31614" t="22394" r="50140" b="72987"/>
-                <a:stretch/>
-              </p:blipFill>
-              <p:spPr>
-                <a:xfrm>
-                  <a:off x="10718617" y="2235628"/>
-                  <a:ext cx="1050731" cy="231348"/>
-                </a:xfrm>
-                <a:prstGeom prst="rect">
-                  <a:avLst/>
-                </a:prstGeom>
-              </p:spPr>
-            </p:pic>
-            <p:pic>
-              <p:nvPicPr>
-                <p:cNvPr id="34" name="Picture 33">
-                  <a:extLst>
-                    <a:ext uri="{FF2B5EF4-FFF2-40B4-BE49-F238E27FC236}">
-                      <a16:creationId xmlns:a16="http://schemas.microsoft.com/office/drawing/2014/main" id="{2058CAEE-ADAC-244F-9A82-6F73F85503FC}"/>
-                    </a:ext>
-                  </a:extLst>
-                </p:cNvPr>
-                <p:cNvPicPr>
-                  <a:picLocks noChangeAspect="1"/>
-                </p:cNvPicPr>
-                <p:nvPr/>
-              </p:nvPicPr>
-              <p:blipFill rotWithShape="1">
-                <a:blip r:embed="rId2"/>
-                <a:srcRect l="30900" t="23577" r="50140" b="73634"/>
-                <a:stretch/>
-              </p:blipFill>
-              <p:spPr>
-                <a:xfrm>
-                  <a:off x="10677525" y="2466977"/>
-                  <a:ext cx="1091823" cy="139698"/>
-                </a:xfrm>
-                <a:prstGeom prst="rect">
-                  <a:avLst/>
-                </a:prstGeom>
-              </p:spPr>
-            </p:pic>
-            <p:pic>
-              <p:nvPicPr>
-                <p:cNvPr id="35" name="Picture 34">
-                  <a:extLst>
-                    <a:ext uri="{FF2B5EF4-FFF2-40B4-BE49-F238E27FC236}">
-                      <a16:creationId xmlns:a16="http://schemas.microsoft.com/office/drawing/2014/main" id="{E09E6E81-7402-2743-9355-220C7AF11CCC}"/>
-                    </a:ext>
-                  </a:extLst>
-                </p:cNvPr>
-                <p:cNvPicPr>
-                  <a:picLocks noChangeAspect="1"/>
-                </p:cNvPicPr>
-                <p:nvPr/>
-              </p:nvPicPr>
-              <p:blipFill rotWithShape="1">
-                <a:blip r:embed="rId2"/>
-                <a:srcRect l="20590" t="25067" r="50140" b="69710"/>
-                <a:stretch/>
-              </p:blipFill>
-              <p:spPr>
-                <a:xfrm>
-                  <a:off x="10083800" y="2576453"/>
-                  <a:ext cx="1685548" cy="261571"/>
-                </a:xfrm>
-                <a:prstGeom prst="rect">
-                  <a:avLst/>
-                </a:prstGeom>
-              </p:spPr>
-            </p:pic>
-            <p:pic>
-              <p:nvPicPr>
-                <p:cNvPr id="36" name="Picture 35">
-                  <a:extLst>
-                    <a:ext uri="{FF2B5EF4-FFF2-40B4-BE49-F238E27FC236}">
-                      <a16:creationId xmlns:a16="http://schemas.microsoft.com/office/drawing/2014/main" id="{9C59D2A1-8106-6644-A56B-55F9A8A109D2}"/>
-                    </a:ext>
-                  </a:extLst>
-                </p:cNvPr>
-                <p:cNvPicPr>
-                  <a:picLocks noChangeAspect="1"/>
-                </p:cNvPicPr>
-                <p:nvPr/>
-              </p:nvPicPr>
-              <p:blipFill rotWithShape="1">
-                <a:blip r:embed="rId2"/>
-                <a:srcRect l="31614" t="21587" r="50140" b="74629"/>
-                <a:stretch/>
-              </p:blipFill>
-              <p:spPr>
-                <a:xfrm>
-                  <a:off x="10718617" y="2791818"/>
-                  <a:ext cx="1050731" cy="189508"/>
-                </a:xfrm>
-                <a:prstGeom prst="rect">
-                  <a:avLst/>
-                </a:prstGeom>
-              </p:spPr>
-            </p:pic>
-            <p:pic>
-              <p:nvPicPr>
-                <p:cNvPr id="37" name="Picture 36">
-                  <a:extLst>
-                    <a:ext uri="{FF2B5EF4-FFF2-40B4-BE49-F238E27FC236}">
-                      <a16:creationId xmlns:a16="http://schemas.microsoft.com/office/drawing/2014/main" id="{2A714BE7-DD59-4E4B-9963-961E6F7342CF}"/>
-                    </a:ext>
-                  </a:extLst>
-                </p:cNvPr>
-                <p:cNvPicPr>
-                  <a:picLocks noChangeAspect="1"/>
-                </p:cNvPicPr>
-                <p:nvPr/>
-              </p:nvPicPr>
-              <p:blipFill rotWithShape="1">
-                <a:blip r:embed="rId2"/>
-                <a:srcRect l="21811" t="24692" r="50140" b="70823"/>
-                <a:stretch/>
-              </p:blipFill>
-              <p:spPr>
-                <a:xfrm>
-                  <a:off x="10154130" y="2913691"/>
-                  <a:ext cx="1615218" cy="224598"/>
-                </a:xfrm>
-                <a:prstGeom prst="rect">
-                  <a:avLst/>
-                </a:prstGeom>
-              </p:spPr>
-            </p:pic>
-            <p:pic>
-              <p:nvPicPr>
-                <p:cNvPr id="38" name="Picture 37">
-                  <a:extLst>
-                    <a:ext uri="{FF2B5EF4-FFF2-40B4-BE49-F238E27FC236}">
-                      <a16:creationId xmlns:a16="http://schemas.microsoft.com/office/drawing/2014/main" id="{538C4A5C-BDCA-374F-8F00-9AA5D3A69052}"/>
-                    </a:ext>
-                  </a:extLst>
-                </p:cNvPr>
-                <p:cNvPicPr>
-                  <a:picLocks noChangeAspect="1"/>
-                </p:cNvPicPr>
-                <p:nvPr/>
-              </p:nvPicPr>
-              <p:blipFill rotWithShape="1">
-                <a:blip r:embed="rId2"/>
-                <a:srcRect l="15958" t="25531" r="50140" b="67983"/>
-                <a:stretch/>
-              </p:blipFill>
-              <p:spPr>
-                <a:xfrm>
-                  <a:off x="9817100" y="3053390"/>
-                  <a:ext cx="1952248" cy="324840"/>
-                </a:xfrm>
-                <a:prstGeom prst="rect">
-                  <a:avLst/>
-                </a:prstGeom>
-              </p:spPr>
-            </p:pic>
-            <p:pic>
-              <p:nvPicPr>
-                <p:cNvPr id="39" name="Picture 38">
-                  <a:extLst>
-                    <a:ext uri="{FF2B5EF4-FFF2-40B4-BE49-F238E27FC236}">
-                      <a16:creationId xmlns:a16="http://schemas.microsoft.com/office/drawing/2014/main" id="{F4AE4A9F-5D9E-754E-9ADA-49810B12EBD5}"/>
-                    </a:ext>
-                  </a:extLst>
-                </p:cNvPr>
-                <p:cNvPicPr>
-                  <a:picLocks noChangeAspect="1"/>
-                </p:cNvPicPr>
-                <p:nvPr/>
-              </p:nvPicPr>
-              <p:blipFill rotWithShape="1">
-                <a:blip r:embed="rId2"/>
-                <a:srcRect l="12540" t="19840" r="50140" b="77661"/>
-                <a:stretch/>
-              </p:blipFill>
-              <p:spPr>
-                <a:xfrm>
-                  <a:off x="9620250" y="3290737"/>
-                  <a:ext cx="2149098" cy="125137"/>
-                </a:xfrm>
-                <a:prstGeom prst="rect">
-                  <a:avLst/>
-                </a:prstGeom>
-              </p:spPr>
-            </p:pic>
-            <p:pic>
-              <p:nvPicPr>
-                <p:cNvPr id="40" name="Picture 39">
-                  <a:extLst>
-                    <a:ext uri="{FF2B5EF4-FFF2-40B4-BE49-F238E27FC236}">
-                      <a16:creationId xmlns:a16="http://schemas.microsoft.com/office/drawing/2014/main" id="{DCF87F1F-5FE8-7C44-9D1E-44A0E240EE40}"/>
-                    </a:ext>
-                  </a:extLst>
-                </p:cNvPr>
-                <p:cNvPicPr>
-                  <a:picLocks noChangeAspect="1"/>
-                </p:cNvPicPr>
-                <p:nvPr/>
-              </p:nvPicPr>
-              <p:blipFill rotWithShape="1">
-                <a:blip r:embed="rId2"/>
-                <a:srcRect l="31614" t="19840" r="50140" b="72499"/>
-                <a:stretch/>
-              </p:blipFill>
-              <p:spPr>
-                <a:xfrm>
-                  <a:off x="10718617" y="3353306"/>
-                  <a:ext cx="1050731" cy="383670"/>
-                </a:xfrm>
-                <a:prstGeom prst="rect">
-                  <a:avLst/>
-                </a:prstGeom>
-              </p:spPr>
-            </p:pic>
-            <p:pic>
-              <p:nvPicPr>
-                <p:cNvPr id="41" name="Picture 40">
-                  <a:extLst>
-                    <a:ext uri="{FF2B5EF4-FFF2-40B4-BE49-F238E27FC236}">
-                      <a16:creationId xmlns:a16="http://schemas.microsoft.com/office/drawing/2014/main" id="{6E23550C-304F-E241-A4C2-EF9BDDF5A2E8}"/>
-                    </a:ext>
-                  </a:extLst>
-                </p:cNvPr>
-                <p:cNvPicPr>
-                  <a:picLocks noChangeAspect="1"/>
-                </p:cNvPicPr>
-                <p:nvPr/>
-              </p:nvPicPr>
-              <p:blipFill rotWithShape="1">
-                <a:blip r:embed="rId2"/>
-                <a:srcRect l="32279" t="21997" r="50140" b="73896"/>
-                <a:stretch/>
-              </p:blipFill>
-              <p:spPr>
-                <a:xfrm>
-                  <a:off x="10756900" y="3736976"/>
-                  <a:ext cx="1012448" cy="205682"/>
-                </a:xfrm>
-                <a:prstGeom prst="rect">
-                  <a:avLst/>
-                </a:prstGeom>
-              </p:spPr>
-            </p:pic>
-            <p:pic>
-              <p:nvPicPr>
-                <p:cNvPr id="42" name="Picture 41">
-                  <a:extLst>
-                    <a:ext uri="{FF2B5EF4-FFF2-40B4-BE49-F238E27FC236}">
-                      <a16:creationId xmlns:a16="http://schemas.microsoft.com/office/drawing/2014/main" id="{BB100FC7-FCA6-5749-9744-2E92E44DBD33}"/>
-                    </a:ext>
-                  </a:extLst>
-                </p:cNvPr>
-                <p:cNvPicPr>
-                  <a:picLocks noChangeAspect="1"/>
-                </p:cNvPicPr>
-                <p:nvPr/>
-              </p:nvPicPr>
-              <p:blipFill rotWithShape="1">
-                <a:blip r:embed="rId2"/>
-                <a:srcRect l="31614" t="22413" r="50140" b="71093"/>
-                <a:stretch/>
-              </p:blipFill>
-              <p:spPr>
-                <a:xfrm>
-                  <a:off x="10718617" y="3852287"/>
-                  <a:ext cx="1050731" cy="325213"/>
-                </a:xfrm>
-                <a:prstGeom prst="rect">
-                  <a:avLst/>
-                </a:prstGeom>
-              </p:spPr>
-            </p:pic>
-            <p:pic>
-              <p:nvPicPr>
-                <p:cNvPr id="43" name="Picture 42">
-                  <a:extLst>
-                    <a:ext uri="{FF2B5EF4-FFF2-40B4-BE49-F238E27FC236}">
-                      <a16:creationId xmlns:a16="http://schemas.microsoft.com/office/drawing/2014/main" id="{5A55EE0B-9905-074E-A7CB-E030ABA69D7B}"/>
-                    </a:ext>
-                  </a:extLst>
-                </p:cNvPr>
-                <p:cNvPicPr>
-                  <a:picLocks noChangeAspect="1"/>
-                </p:cNvPicPr>
-                <p:nvPr/>
-              </p:nvPicPr>
-              <p:blipFill rotWithShape="1">
-                <a:blip r:embed="rId2"/>
-                <a:srcRect l="15959" t="22641" r="50140" b="74221"/>
-                <a:stretch/>
-              </p:blipFill>
-              <p:spPr>
-                <a:xfrm>
-                  <a:off x="9817100" y="4057969"/>
-                  <a:ext cx="1952248" cy="157175"/>
-                </a:xfrm>
-                <a:prstGeom prst="rect">
-                  <a:avLst/>
-                </a:prstGeom>
-              </p:spPr>
-            </p:pic>
-            <p:pic>
-              <p:nvPicPr>
-                <p:cNvPr id="44" name="Picture 43">
-                  <a:extLst>
-                    <a:ext uri="{FF2B5EF4-FFF2-40B4-BE49-F238E27FC236}">
-                      <a16:creationId xmlns:a16="http://schemas.microsoft.com/office/drawing/2014/main" id="{85F071D7-7DD8-D94B-92E7-62B77CAD45CA}"/>
-                    </a:ext>
-                  </a:extLst>
-                </p:cNvPr>
-                <p:cNvPicPr>
-                  <a:picLocks noChangeAspect="1"/>
-                </p:cNvPicPr>
-                <p:nvPr/>
-              </p:nvPicPr>
-              <p:blipFill rotWithShape="1">
-                <a:blip r:embed="rId2"/>
-                <a:srcRect l="33506" t="19840" r="50140" b="75474"/>
-                <a:stretch/>
-              </p:blipFill>
-              <p:spPr>
-                <a:xfrm>
-                  <a:off x="10827553" y="4095758"/>
-                  <a:ext cx="941795" cy="234697"/>
-                </a:xfrm>
-                <a:prstGeom prst="rect">
-                  <a:avLst/>
-                </a:prstGeom>
-              </p:spPr>
-            </p:pic>
-            <p:pic>
-              <p:nvPicPr>
-                <p:cNvPr id="45" name="Picture 44">
-                  <a:extLst>
-                    <a:ext uri="{FF2B5EF4-FFF2-40B4-BE49-F238E27FC236}">
-                      <a16:creationId xmlns:a16="http://schemas.microsoft.com/office/drawing/2014/main" id="{68E177A8-D8EF-DD44-8BD1-A265246D86A9}"/>
-                    </a:ext>
-                  </a:extLst>
-                </p:cNvPr>
-                <p:cNvPicPr>
-                  <a:picLocks noChangeAspect="1"/>
-                </p:cNvPicPr>
-                <p:nvPr/>
-              </p:nvPicPr>
-              <p:blipFill rotWithShape="1">
-                <a:blip r:embed="rId2"/>
-                <a:srcRect l="12540" t="19840" r="50140" b="78034"/>
-                <a:stretch/>
-              </p:blipFill>
-              <p:spPr>
-                <a:xfrm>
-                  <a:off x="9620250" y="4319384"/>
-                  <a:ext cx="2149098" cy="106476"/>
-                </a:xfrm>
-                <a:prstGeom prst="rect">
-                  <a:avLst/>
-                </a:prstGeom>
-              </p:spPr>
-            </p:pic>
-            <p:pic>
-              <p:nvPicPr>
-                <p:cNvPr id="46" name="Picture 45">
-                  <a:extLst>
-                    <a:ext uri="{FF2B5EF4-FFF2-40B4-BE49-F238E27FC236}">
-                      <a16:creationId xmlns:a16="http://schemas.microsoft.com/office/drawing/2014/main" id="{FE893AB3-F5CF-9041-942B-75C015219F8F}"/>
-                    </a:ext>
-                  </a:extLst>
-                </p:cNvPr>
-                <p:cNvPicPr>
-                  <a:picLocks noChangeAspect="1"/>
-                </p:cNvPicPr>
-                <p:nvPr/>
-              </p:nvPicPr>
-              <p:blipFill rotWithShape="1">
-                <a:blip r:embed="rId2"/>
-                <a:srcRect l="31614" t="25054" r="50140" b="70242"/>
-                <a:stretch/>
-              </p:blipFill>
-              <p:spPr>
-                <a:xfrm>
-                  <a:off x="10718617" y="4530100"/>
-                  <a:ext cx="1050731" cy="235575"/>
-                </a:xfrm>
-                <a:prstGeom prst="rect">
-                  <a:avLst/>
-                </a:prstGeom>
-              </p:spPr>
-            </p:pic>
-            <p:pic>
-              <p:nvPicPr>
-                <p:cNvPr id="47" name="Picture 46">
-                  <a:extLst>
-                    <a:ext uri="{FF2B5EF4-FFF2-40B4-BE49-F238E27FC236}">
-                      <a16:creationId xmlns:a16="http://schemas.microsoft.com/office/drawing/2014/main" id="{D900B619-BB00-CB4D-94EE-446933A5B928}"/>
-                    </a:ext>
-                  </a:extLst>
-                </p:cNvPr>
-                <p:cNvPicPr>
-                  <a:picLocks noChangeAspect="1"/>
-                </p:cNvPicPr>
-                <p:nvPr/>
-              </p:nvPicPr>
-              <p:blipFill rotWithShape="1">
-                <a:blip r:embed="rId2"/>
-                <a:srcRect l="35435" t="25822" r="50140" b="69332"/>
-                <a:stretch/>
-              </p:blipFill>
-              <p:spPr>
-                <a:xfrm>
-                  <a:off x="10937875" y="4663206"/>
-                  <a:ext cx="830692" cy="242710"/>
-                </a:xfrm>
-                <a:prstGeom prst="rect">
-                  <a:avLst/>
-                </a:prstGeom>
-              </p:spPr>
-            </p:pic>
-            <p:pic>
-              <p:nvPicPr>
-                <p:cNvPr id="48" name="Picture 47">
-                  <a:extLst>
-                    <a:ext uri="{FF2B5EF4-FFF2-40B4-BE49-F238E27FC236}">
-                      <a16:creationId xmlns:a16="http://schemas.microsoft.com/office/drawing/2014/main" id="{A53E8206-C82A-6146-9687-43943A81A266}"/>
-                    </a:ext>
-                  </a:extLst>
-                </p:cNvPr>
-                <p:cNvPicPr>
-                  <a:picLocks noChangeAspect="1"/>
-                </p:cNvPicPr>
-                <p:nvPr/>
-              </p:nvPicPr>
-              <p:blipFill rotWithShape="1">
-                <a:blip r:embed="rId2"/>
-                <a:srcRect l="14263" t="31064" r="50140" b="66974"/>
-                <a:stretch/>
-              </p:blipFill>
-              <p:spPr>
-                <a:xfrm>
-                  <a:off x="9718675" y="4869915"/>
-                  <a:ext cx="2049892" cy="98274"/>
-                </a:xfrm>
-                <a:prstGeom prst="rect">
-                  <a:avLst/>
-                </a:prstGeom>
-              </p:spPr>
-            </p:pic>
-            <p:pic>
-              <p:nvPicPr>
-                <p:cNvPr id="49" name="Picture 48">
-                  <a:extLst>
-                    <a:ext uri="{FF2B5EF4-FFF2-40B4-BE49-F238E27FC236}">
-                      <a16:creationId xmlns:a16="http://schemas.microsoft.com/office/drawing/2014/main" id="{C32FD31F-AF0F-0445-B77A-85A17B3629FD}"/>
-                    </a:ext>
-                  </a:extLst>
-                </p:cNvPr>
-                <p:cNvPicPr>
-                  <a:picLocks noChangeAspect="1"/>
-                </p:cNvPicPr>
-                <p:nvPr/>
-              </p:nvPicPr>
-              <p:blipFill rotWithShape="1">
-                <a:blip r:embed="rId2"/>
-                <a:srcRect l="24628" t="19840" r="58092" b="66974"/>
-                <a:stretch/>
-              </p:blipFill>
-              <p:spPr>
-                <a:xfrm>
-                  <a:off x="10985500" y="4092722"/>
-                  <a:ext cx="995035" cy="660401"/>
-                </a:xfrm>
-                <a:prstGeom prst="rect">
-                  <a:avLst/>
-                </a:prstGeom>
-              </p:spPr>
-            </p:pic>
-          </p:grpSp>
-          <p:pic>
-            <p:nvPicPr>
-              <p:cNvPr id="51" name="Picture 50">
-                <a:extLst>
-                  <a:ext uri="{FF2B5EF4-FFF2-40B4-BE49-F238E27FC236}">
-                    <a16:creationId xmlns:a16="http://schemas.microsoft.com/office/drawing/2014/main" id="{B6D76D5E-D58E-E54D-8B00-7B94C4023C9B}"/>
-                  </a:ext>
-                </a:extLst>
-              </p:cNvPr>
-              <p:cNvPicPr>
-                <a:picLocks noChangeAspect="1"/>
-              </p:cNvPicPr>
-              <p:nvPr/>
-            </p:nvPicPr>
-            <p:blipFill rotWithShape="1">
-              <a:blip r:embed="rId2"/>
-              <a:srcRect l="4132" t="28065" r="94689" b="66974"/>
-              <a:stretch/>
-            </p:blipFill>
-            <p:spPr>
-              <a:xfrm>
-                <a:off x="6468515" y="4163785"/>
-                <a:ext cx="67875" cy="248447"/>
-              </a:xfrm>
-              <a:prstGeom prst="rect">
-                <a:avLst/>
-              </a:prstGeom>
-            </p:spPr>
-          </p:pic>
-        </p:grpSp>
-        <p:pic>
-          <p:nvPicPr>
-            <p:cNvPr id="53" name="Picture 52">
-              <a:extLst>
-                <a:ext uri="{FF2B5EF4-FFF2-40B4-BE49-F238E27FC236}">
-                  <a16:creationId xmlns:a16="http://schemas.microsoft.com/office/drawing/2014/main" id="{F589DA9F-C0F5-D340-8D8B-6E2CE4B9B2C3}"/>
-                </a:ext>
-              </a:extLst>
-            </p:cNvPr>
-            <p:cNvPicPr>
-              <a:picLocks noChangeAspect="1"/>
-            </p:cNvPicPr>
-            <p:nvPr/>
-          </p:nvPicPr>
-          <p:blipFill rotWithShape="1">
-            <a:blip r:embed="rId2"/>
-            <a:srcRect l="4132" t="28065" r="94689" b="66974"/>
-            <a:stretch/>
-          </p:blipFill>
-          <p:spPr>
-            <a:xfrm>
-              <a:off x="9451975" y="2651125"/>
-              <a:ext cx="57150" cy="76598"/>
-            </a:xfrm>
-            <a:prstGeom prst="rect">
-              <a:avLst/>
-            </a:prstGeom>
-          </p:spPr>
-        </p:pic>
-      </p:grpSp>
-      <p:pic>
-        <p:nvPicPr>
-          <p:cNvPr id="19" name="Picture 18">
-            <a:extLst>
-              <a:ext uri="{FF2B5EF4-FFF2-40B4-BE49-F238E27FC236}">
-                <a16:creationId xmlns:a16="http://schemas.microsoft.com/office/drawing/2014/main" id="{21C4B74C-4D11-5F47-AE6A-6E26B2F79067}"/>
+                <a16:creationId xmlns:a16="http://schemas.microsoft.com/office/drawing/2014/main" id="{AF2E562F-583B-5743-9CCE-598FE3E35843}"/>
               </a:ext>
             </a:extLst>
           </p:cNvPr>
@@ -3834,14 +2988,43 @@
           <p:nvPr/>
         </p:nvPicPr>
         <p:blipFill rotWithShape="1">
-          <a:blip r:embed="rId4"/>
-          <a:srcRect t="1113" b="3415"/>
+          <a:blip r:embed="rId2"/>
+          <a:srcRect t="2479" b="4623"/>
           <a:stretch/>
         </p:blipFill>
         <p:spPr>
           <a:xfrm>
-            <a:off x="81368" y="83048"/>
-            <a:ext cx="5859553" cy="4894895"/>
+            <a:off x="142821" y="104768"/>
+            <a:ext cx="5173405" cy="4884516"/>
+          </a:xfrm>
+          <a:prstGeom prst="rect">
+            <a:avLst/>
+          </a:prstGeom>
+        </p:spPr>
+      </p:pic>
+      <p:pic>
+        <p:nvPicPr>
+          <p:cNvPr id="3" name="Picture 2">
+            <a:extLst>
+              <a:ext uri="{FF2B5EF4-FFF2-40B4-BE49-F238E27FC236}">
+                <a16:creationId xmlns:a16="http://schemas.microsoft.com/office/drawing/2014/main" id="{E9518832-1B09-FA49-BBD5-66F37FD1BE65}"/>
+              </a:ext>
+            </a:extLst>
+          </p:cNvPr>
+          <p:cNvPicPr>
+            <a:picLocks noChangeAspect="1"/>
+          </p:cNvPicPr>
+          <p:nvPr/>
+        </p:nvPicPr>
+        <p:blipFill rotWithShape="1">
+          <a:blip r:embed="rId3"/>
+          <a:srcRect t="2727" r="3100" b="3451"/>
+          <a:stretch/>
+        </p:blipFill>
+        <p:spPr>
+          <a:xfrm>
+            <a:off x="5297514" y="351523"/>
+            <a:ext cx="4926314" cy="4664485"/>
           </a:xfrm>
           <a:prstGeom prst="rect">
             <a:avLst/>
@@ -3862,8 +3045,8 @@
         </p:nvSpPr>
         <p:spPr>
           <a:xfrm>
-            <a:off x="104812" y="4943773"/>
-            <a:ext cx="5710218" cy="276999"/>
+            <a:off x="441755" y="4943591"/>
+            <a:ext cx="4727576" cy="276999"/>
           </a:xfrm>
           <a:prstGeom prst="rect">
             <a:avLst/>
@@ -3883,7 +3066,7 @@
                 <a:latin typeface="Arial" panose="020B0604020202020204" pitchFamily="34" charset="0"/>
                 <a:cs typeface="Arial" panose="020B0604020202020204" pitchFamily="34" charset="0"/>
               </a:rPr>
-              <a:t>1952      1960       1968        1976       1984       1992       2000        2008       2016</a:t>
+              <a:t>1974        1981        1988         1995        2002         2009        2016</a:t>
             </a:r>
           </a:p>
         </p:txBody>
@@ -3903,13 +3086,13 @@
           <p:nvPr/>
         </p:nvPicPr>
         <p:blipFill rotWithShape="1">
-          <a:blip r:embed="rId3"/>
+          <a:blip r:embed="rId4"/>
           <a:srcRect l="21142" t="29207" r="77614" b="69101"/>
           <a:stretch/>
         </p:blipFill>
         <p:spPr>
           <a:xfrm>
-            <a:off x="107980" y="44984"/>
+            <a:off x="125414" y="44984"/>
             <a:ext cx="1179143" cy="306538"/>
           </a:xfrm>
           <a:prstGeom prst="rect">
@@ -3931,7 +3114,7 @@
         </p:nvSpPr>
         <p:spPr>
           <a:xfrm>
-            <a:off x="6352883" y="4943774"/>
+            <a:off x="5626397" y="4943776"/>
             <a:ext cx="4554452" cy="276999"/>
           </a:xfrm>
           <a:prstGeom prst="rect">
@@ -3952,7 +3135,7 @@
                 <a:latin typeface="Arial" panose="020B0604020202020204" pitchFamily="34" charset="0"/>
                 <a:cs typeface="Arial" panose="020B0604020202020204" pitchFamily="34" charset="0"/>
               </a:rPr>
-              <a:t>1980       1986        1992         1998        2004       2010       2016</a:t>
+              <a:t>1980       1986        1992        1998        2004        2010        2016</a:t>
             </a:r>
           </a:p>
         </p:txBody>
@@ -3971,7 +3154,7 @@
         </p:nvSpPr>
         <p:spPr>
           <a:xfrm>
-            <a:off x="8858435" y="358002"/>
+            <a:off x="8072071" y="482267"/>
             <a:ext cx="663964" cy="307777"/>
           </a:xfrm>
           <a:prstGeom prst="rect">
@@ -4014,7 +3197,7 @@
         </p:nvSpPr>
         <p:spPr>
           <a:xfrm>
-            <a:off x="18974" y="14981"/>
+            <a:off x="36407" y="14983"/>
             <a:ext cx="389850" cy="461665"/>
           </a:xfrm>
           <a:prstGeom prst="rect">
@@ -4054,7 +3237,7 @@
         </p:nvSpPr>
         <p:spPr>
           <a:xfrm>
-            <a:off x="3108066" y="358002"/>
+            <a:off x="2423188" y="487206"/>
             <a:ext cx="612668" cy="307777"/>
           </a:xfrm>
           <a:prstGeom prst="rect">
@@ -4083,6 +3266,35 @@
           </a:p>
         </p:txBody>
       </p:sp>
+      <p:pic>
+        <p:nvPicPr>
+          <p:cNvPr id="55" name="Picture 54">
+            <a:extLst>
+              <a:ext uri="{FF2B5EF4-FFF2-40B4-BE49-F238E27FC236}">
+                <a16:creationId xmlns:a16="http://schemas.microsoft.com/office/drawing/2014/main" id="{69752C01-9DEA-7A48-8C0A-E42CF2302CEC}"/>
+              </a:ext>
+            </a:extLst>
+          </p:cNvPr>
+          <p:cNvPicPr>
+            <a:picLocks noChangeAspect="1"/>
+          </p:cNvPicPr>
+          <p:nvPr/>
+        </p:nvPicPr>
+        <p:blipFill rotWithShape="1">
+          <a:blip r:embed="rId4"/>
+          <a:srcRect l="21142" t="29207" r="77614" b="69101"/>
+          <a:stretch/>
+        </p:blipFill>
+        <p:spPr>
+          <a:xfrm>
+            <a:off x="5179036" y="272495"/>
+            <a:ext cx="1179143" cy="306538"/>
+          </a:xfrm>
+          <a:prstGeom prst="rect">
+            <a:avLst/>
+          </a:prstGeom>
+        </p:spPr>
+      </p:pic>
       <p:sp>
         <p:nvSpPr>
           <p:cNvPr id="15" name="Rectangle 14">
@@ -4097,7 +3309,7 @@
         </p:nvSpPr>
         <p:spPr>
           <a:xfrm>
-            <a:off x="6162175" y="14984"/>
+            <a:off x="5435689" y="14986"/>
             <a:ext cx="389850" cy="461665"/>
           </a:xfrm>
           <a:prstGeom prst="rect">
@@ -4123,6 +3335,35 @@
           </a:p>
         </p:txBody>
       </p:sp>
+      <p:pic>
+        <p:nvPicPr>
+          <p:cNvPr id="56" name="Picture 55">
+            <a:extLst>
+              <a:ext uri="{FF2B5EF4-FFF2-40B4-BE49-F238E27FC236}">
+                <a16:creationId xmlns:a16="http://schemas.microsoft.com/office/drawing/2014/main" id="{0E0FB1DB-E8F4-5F4A-A2B0-B8598CD9385C}"/>
+              </a:ext>
+            </a:extLst>
+          </p:cNvPr>
+          <p:cNvPicPr>
+            <a:picLocks noChangeAspect="1"/>
+          </p:cNvPicPr>
+          <p:nvPr/>
+        </p:nvPicPr>
+        <p:blipFill rotWithShape="1">
+          <a:blip r:embed="rId3"/>
+          <a:srcRect l="17278" t="73957" r="70366" b="19046"/>
+          <a:stretch/>
+        </p:blipFill>
+        <p:spPr>
+          <a:xfrm>
+            <a:off x="5506041" y="3647660"/>
+            <a:ext cx="628219" cy="347870"/>
+          </a:xfrm>
+          <a:prstGeom prst="rect">
+            <a:avLst/>
+          </a:prstGeom>
+        </p:spPr>
+      </p:pic>
     </p:spTree>
     <p:extLst>
       <p:ext uri="{BB962C8B-B14F-4D97-AF65-F5344CB8AC3E}">

</xml_diff>